<commit_message>
Rework the entire indexing process. Now URL are supported and working. Added some file support.
</commit_message>
<xml_diff>
--- a/help.pptx
+++ b/help.pptx
@@ -7,6 +7,7 @@
   <p:sldIdLst>
     <p:sldId id="256" r:id="rId2"/>
     <p:sldId id="257" r:id="rId3"/>
+    <p:sldId id="258" r:id="rId4"/>
   </p:sldIdLst>
   <p:sldSz cx="12192000" cy="6858000"/>
   <p:notesSz cx="6858000" cy="9144000"/>
@@ -4496,6 +4497,266 @@
 </p:sld>
 </file>
 
+<file path=ppt/slides/slide3.xml><?xml version="1.0" encoding="utf-8"?>
+<p:sld xmlns:a="http://schemas.openxmlformats.org/drawingml/2006/main" xmlns:r="http://schemas.openxmlformats.org/officeDocument/2006/relationships" xmlns:p="http://schemas.openxmlformats.org/presentationml/2006/main">
+  <p:cSld>
+    <p:spTree>
+      <p:nvGrpSpPr>
+        <p:cNvPr id="1" name=""/>
+        <p:cNvGrpSpPr/>
+        <p:nvPr/>
+      </p:nvGrpSpPr>
+      <p:grpSpPr>
+        <a:xfrm>
+          <a:off x="0" y="0"/>
+          <a:ext cx="0" cy="0"/>
+          <a:chOff x="0" y="0"/>
+          <a:chExt cx="0" cy="0"/>
+        </a:xfrm>
+      </p:grpSpPr>
+      <p:sp>
+        <p:nvSpPr>
+          <p:cNvPr id="3" name="Rectangle 2">
+            <a:extLst>
+              <a:ext uri="{FF2B5EF4-FFF2-40B4-BE49-F238E27FC236}">
+                <a16:creationId xmlns:a16="http://schemas.microsoft.com/office/drawing/2014/main" id="{0DBB441B-DB12-0836-7A66-B598A58CE95F}"/>
+              </a:ext>
+            </a:extLst>
+          </p:cNvPr>
+          <p:cNvSpPr/>
+          <p:nvPr/>
+        </p:nvSpPr>
+        <p:spPr>
+          <a:xfrm>
+            <a:off x="152398" y="186613"/>
+            <a:ext cx="3853546" cy="6450563"/>
+          </a:xfrm>
+          <a:prstGeom prst="rect">
+            <a:avLst/>
+          </a:prstGeom>
+        </p:spPr>
+        <p:style>
+          <a:lnRef idx="2">
+            <a:schemeClr val="accent3">
+              <a:shade val="15000"/>
+            </a:schemeClr>
+          </a:lnRef>
+          <a:fillRef idx="1">
+            <a:schemeClr val="accent3"/>
+          </a:fillRef>
+          <a:effectRef idx="0">
+            <a:schemeClr val="accent3"/>
+          </a:effectRef>
+          <a:fontRef idx="minor">
+            <a:schemeClr val="lt1"/>
+          </a:fontRef>
+        </p:style>
+        <p:txBody>
+          <a:bodyPr rtlCol="0" anchor="t"/>
+          <a:lstStyle/>
+          <a:p>
+            <a:pPr marL="285750" indent="-285750">
+              <a:buFont typeface="Arial" panose="020B0604020202020204" pitchFamily="34" charset="0"/>
+              <a:buChar char="•"/>
+            </a:pPr>
+            <a:r>
+              <a:rPr lang="en-CA" sz="1200" dirty="0"/>
+              <a:t>List files in folder (Corpus Location)</a:t>
+            </a:r>
+          </a:p>
+          <a:p>
+            <a:pPr marL="742950" lvl="1" indent="-285750">
+              <a:buFont typeface="Arial" panose="020B0604020202020204" pitchFamily="34" charset="0"/>
+              <a:buChar char="•"/>
+            </a:pPr>
+            <a:r>
+              <a:rPr lang="en-CA" sz="1200" dirty="0"/>
+              <a:t>Local </a:t>
+            </a:r>
+            <a:r>
+              <a:rPr lang="en-CA" sz="1200" dirty="0" err="1"/>
+              <a:t>filepath</a:t>
+            </a:r>
+            <a:endParaRPr lang="en-CA" sz="1200" dirty="0"/>
+          </a:p>
+          <a:p>
+            <a:pPr marL="285750" indent="-285750">
+              <a:buFont typeface="Arial" panose="020B0604020202020204" pitchFamily="34" charset="0"/>
+              <a:buChar char="•"/>
+            </a:pPr>
+            <a:r>
+              <a:rPr lang="en-CA" sz="1200" dirty="0"/>
+              <a:t>Read File Content (Get unique Labels and URLs)</a:t>
+            </a:r>
+          </a:p>
+          <a:p>
+            <a:pPr marL="285750" indent="-285750">
+              <a:buFont typeface="Arial" panose="020B0604020202020204" pitchFamily="34" charset="0"/>
+              <a:buChar char="•"/>
+            </a:pPr>
+            <a:r>
+              <a:rPr lang="en-CA" sz="1200" dirty="0"/>
+              <a:t>Crawl URLs (if setting is enabled)</a:t>
+            </a:r>
+          </a:p>
+          <a:p>
+            <a:pPr marL="285750" indent="-285750">
+              <a:buFont typeface="Arial" panose="020B0604020202020204" pitchFamily="34" charset="0"/>
+              <a:buChar char="•"/>
+            </a:pPr>
+            <a:r>
+              <a:rPr lang="en-CA" sz="1200" dirty="0"/>
+              <a:t>Read Web File Content (Get unique Labels)</a:t>
+            </a:r>
+          </a:p>
+          <a:p>
+            <a:pPr marL="285750" indent="-285750">
+              <a:buFont typeface="Arial" panose="020B0604020202020204" pitchFamily="34" charset="0"/>
+              <a:buChar char="•"/>
+            </a:pPr>
+            <a:r>
+              <a:rPr lang="en-CA" sz="1200" dirty="0"/>
+              <a:t>Compute Metric (TF-IDF, Label Count, </a:t>
+            </a:r>
+            <a:r>
+              <a:rPr lang="en-CA" sz="1200" dirty="0" err="1"/>
+              <a:t>etc</a:t>
+            </a:r>
+            <a:r>
+              <a:rPr lang="en-CA" sz="1200" dirty="0"/>
+              <a:t>)</a:t>
+            </a:r>
+          </a:p>
+          <a:p>
+            <a:pPr marL="285750" indent="-285750">
+              <a:buFont typeface="Arial" panose="020B0604020202020204" pitchFamily="34" charset="0"/>
+              <a:buChar char="•"/>
+            </a:pPr>
+            <a:r>
+              <a:rPr lang="en-CA" sz="1200" dirty="0"/>
+              <a:t>Save Document Metric in Corpora Location</a:t>
+            </a:r>
+          </a:p>
+          <a:p>
+            <a:pPr marL="742950" lvl="1" indent="-285750">
+              <a:buFont typeface="Arial" panose="020B0604020202020204" pitchFamily="34" charset="0"/>
+              <a:buChar char="•"/>
+            </a:pPr>
+            <a:r>
+              <a:rPr lang="en-CA" sz="1200" dirty="0"/>
+              <a:t>Document Source is Local or Web for now</a:t>
+            </a:r>
+          </a:p>
+        </p:txBody>
+      </p:sp>
+      <p:sp>
+        <p:nvSpPr>
+          <p:cNvPr id="9" name="Rectangle 8">
+            <a:extLst>
+              <a:ext uri="{FF2B5EF4-FFF2-40B4-BE49-F238E27FC236}">
+                <a16:creationId xmlns:a16="http://schemas.microsoft.com/office/drawing/2014/main" id="{32F21D5F-B464-A923-F681-F384E6FE2AE0}"/>
+              </a:ext>
+            </a:extLst>
+          </p:cNvPr>
+          <p:cNvSpPr/>
+          <p:nvPr/>
+        </p:nvSpPr>
+        <p:spPr>
+          <a:xfrm>
+            <a:off x="4441370" y="189724"/>
+            <a:ext cx="3853546" cy="6450563"/>
+          </a:xfrm>
+          <a:prstGeom prst="rect">
+            <a:avLst/>
+          </a:prstGeom>
+        </p:spPr>
+        <p:style>
+          <a:lnRef idx="2">
+            <a:schemeClr val="accent3">
+              <a:shade val="15000"/>
+            </a:schemeClr>
+          </a:lnRef>
+          <a:fillRef idx="1">
+            <a:schemeClr val="accent3"/>
+          </a:fillRef>
+          <a:effectRef idx="0">
+            <a:schemeClr val="accent3"/>
+          </a:effectRef>
+          <a:fontRef idx="minor">
+            <a:schemeClr val="lt1"/>
+          </a:fontRef>
+        </p:style>
+        <p:txBody>
+          <a:bodyPr rtlCol="0" anchor="t"/>
+          <a:lstStyle/>
+          <a:p>
+            <a:pPr marL="285750" indent="-285750">
+              <a:buFont typeface="Arial" panose="020B0604020202020204" pitchFamily="34" charset="0"/>
+              <a:buChar char="•"/>
+            </a:pPr>
+            <a:r>
+              <a:rPr lang="en-CA" sz="1200" dirty="0"/>
+              <a:t>Document Source (Local path, Web URL, </a:t>
+            </a:r>
+            <a:r>
+              <a:rPr lang="en-CA" sz="1200" dirty="0" err="1"/>
+              <a:t>etc</a:t>
+            </a:r>
+            <a:r>
+              <a:rPr lang="en-CA" sz="1200" dirty="0"/>
+              <a:t>)</a:t>
+            </a:r>
+          </a:p>
+          <a:p>
+            <a:pPr marL="285750" indent="-285750">
+              <a:buFont typeface="Arial" panose="020B0604020202020204" pitchFamily="34" charset="0"/>
+              <a:buChar char="•"/>
+            </a:pPr>
+            <a:r>
+              <a:rPr lang="en-CA" sz="1200" dirty="0"/>
+              <a:t>Document Location (local </a:t>
+            </a:r>
+            <a:r>
+              <a:rPr lang="en-CA" sz="1200" dirty="0" err="1"/>
+              <a:t>filepath</a:t>
+            </a:r>
+            <a:r>
+              <a:rPr lang="en-CA" sz="1200" dirty="0"/>
+              <a:t> for the reader)</a:t>
+            </a:r>
+          </a:p>
+          <a:p>
+            <a:pPr marL="285750" indent="-285750">
+              <a:buFont typeface="Arial" panose="020B0604020202020204" pitchFamily="34" charset="0"/>
+              <a:buChar char="•"/>
+            </a:pPr>
+            <a:r>
+              <a:rPr lang="en-CA" sz="1200" dirty="0"/>
+              <a:t>Document Type (for the reader decoding)</a:t>
+            </a:r>
+          </a:p>
+          <a:p>
+            <a:pPr marL="285750" indent="-285750">
+              <a:buFont typeface="Arial" panose="020B0604020202020204" pitchFamily="34" charset="0"/>
+              <a:buChar char="•"/>
+            </a:pPr>
+            <a:endParaRPr lang="en-CA" sz="1200" dirty="0"/>
+          </a:p>
+        </p:txBody>
+      </p:sp>
+    </p:spTree>
+    <p:extLst>
+      <p:ext uri="{BB962C8B-B14F-4D97-AF65-F5344CB8AC3E}">
+        <p14:creationId xmlns:p14="http://schemas.microsoft.com/office/powerpoint/2010/main" val="660596267"/>
+      </p:ext>
+    </p:extLst>
+  </p:cSld>
+  <p:clrMapOvr>
+    <a:masterClrMapping/>
+  </p:clrMapOvr>
+</p:sld>
+</file>
+
 <file path=ppt/theme/theme1.xml><?xml version="1.0" encoding="utf-8"?>
 <a:theme xmlns:a="http://schemas.openxmlformats.org/drawingml/2006/main" name="Office Theme">
   <a:themeElements>

</xml_diff>